<commit_message>
DeveloperGuide: Updated diagram & description for Logic, Model, Storage & Versioned Tasketch to suit our project.
</commit_message>
<xml_diff>
--- a/docs/diagrams/LogicComponentClassDiagram.pptx
+++ b/docs/diagrams/LogicComponentClassDiagram.pptx
@@ -126,10 +126,6 @@
 </p:presentation>
 </file>
 
-<file path=ppt/revisionInfo.xml><?xml version="1.0" encoding="utf-8"?>
-<p1510:revInfo xmlns:a="http://schemas.openxmlformats.org/drawingml/2006/main" xmlns:r="http://schemas.openxmlformats.org/officeDocument/2006/relationships" xmlns:p1510="http://schemas.microsoft.com/office/powerpoint/2015/10/main"/>
-</file>
-
 <file path=ppt/notesMasters/notesMaster1.xml><?xml version="1.0" encoding="utf-8"?>
 <p:notesMaster xmlns:a="http://schemas.openxmlformats.org/drawingml/2006/main" xmlns:r="http://schemas.openxmlformats.org/officeDocument/2006/relationships" xmlns:p="http://schemas.openxmlformats.org/presentationml/2006/main">
   <p:cSld>
@@ -212,7 +208,7 @@
           <a:p>
             <a:fld id="{F5CC4B3F-88C1-4FFA-B1B6-F41C21DC6924}" type="datetimeFigureOut">
               <a:rPr lang="en-US" smtClean="0"/>
-              <a:t>4/16/2018</a:t>
+              <a:t>09-Apr-19</a:t>
             </a:fld>
             <a:endParaRPr lang="en-US"/>
           </a:p>
@@ -658,7 +654,7 @@
           <a:p>
             <a:fld id="{78C97017-6FC3-485B-9764-EAC9E56C1D49}" type="datetimeFigureOut">
               <a:rPr lang="en-US" smtClean="0"/>
-              <a:t>4/16/2018</a:t>
+              <a:t>09-Apr-19</a:t>
             </a:fld>
             <a:endParaRPr lang="en-US"/>
           </a:p>
@@ -826,7 +822,7 @@
           <a:p>
             <a:fld id="{78C97017-6FC3-485B-9764-EAC9E56C1D49}" type="datetimeFigureOut">
               <a:rPr lang="en-US" smtClean="0"/>
-              <a:t>4/16/2018</a:t>
+              <a:t>09-Apr-19</a:t>
             </a:fld>
             <a:endParaRPr lang="en-US"/>
           </a:p>
@@ -1004,7 +1000,7 @@
           <a:p>
             <a:fld id="{78C97017-6FC3-485B-9764-EAC9E56C1D49}" type="datetimeFigureOut">
               <a:rPr lang="en-US" smtClean="0"/>
-              <a:t>4/16/2018</a:t>
+              <a:t>09-Apr-19</a:t>
             </a:fld>
             <a:endParaRPr lang="en-US"/>
           </a:p>
@@ -1172,7 +1168,7 @@
           <a:p>
             <a:fld id="{78C97017-6FC3-485B-9764-EAC9E56C1D49}" type="datetimeFigureOut">
               <a:rPr lang="en-US" smtClean="0"/>
-              <a:t>4/16/2018</a:t>
+              <a:t>09-Apr-19</a:t>
             </a:fld>
             <a:endParaRPr lang="en-US"/>
           </a:p>
@@ -1417,7 +1413,7 @@
           <a:p>
             <a:fld id="{78C97017-6FC3-485B-9764-EAC9E56C1D49}" type="datetimeFigureOut">
               <a:rPr lang="en-US" smtClean="0"/>
-              <a:t>4/16/2018</a:t>
+              <a:t>09-Apr-19</a:t>
             </a:fld>
             <a:endParaRPr lang="en-US"/>
           </a:p>
@@ -1702,7 +1698,7 @@
           <a:p>
             <a:fld id="{78C97017-6FC3-485B-9764-EAC9E56C1D49}" type="datetimeFigureOut">
               <a:rPr lang="en-US" smtClean="0"/>
-              <a:t>4/16/2018</a:t>
+              <a:t>09-Apr-19</a:t>
             </a:fld>
             <a:endParaRPr lang="en-US"/>
           </a:p>
@@ -2121,7 +2117,7 @@
           <a:p>
             <a:fld id="{78C97017-6FC3-485B-9764-EAC9E56C1D49}" type="datetimeFigureOut">
               <a:rPr lang="en-US" smtClean="0"/>
-              <a:t>4/16/2018</a:t>
+              <a:t>09-Apr-19</a:t>
             </a:fld>
             <a:endParaRPr lang="en-US"/>
           </a:p>
@@ -2238,7 +2234,7 @@
           <a:p>
             <a:fld id="{78C97017-6FC3-485B-9764-EAC9E56C1D49}" type="datetimeFigureOut">
               <a:rPr lang="en-US" smtClean="0"/>
-              <a:t>4/16/2018</a:t>
+              <a:t>09-Apr-19</a:t>
             </a:fld>
             <a:endParaRPr lang="en-US"/>
           </a:p>
@@ -2333,7 +2329,7 @@
           <a:p>
             <a:fld id="{78C97017-6FC3-485B-9764-EAC9E56C1D49}" type="datetimeFigureOut">
               <a:rPr lang="en-US" smtClean="0"/>
-              <a:t>4/16/2018</a:t>
+              <a:t>09-Apr-19</a:t>
             </a:fld>
             <a:endParaRPr lang="en-US"/>
           </a:p>
@@ -2608,7 +2604,7 @@
           <a:p>
             <a:fld id="{78C97017-6FC3-485B-9764-EAC9E56C1D49}" type="datetimeFigureOut">
               <a:rPr lang="en-US" smtClean="0"/>
-              <a:t>4/16/2018</a:t>
+              <a:t>09-Apr-19</a:t>
             </a:fld>
             <a:endParaRPr lang="en-US"/>
           </a:p>
@@ -2860,7 +2856,7 @@
           <a:p>
             <a:fld id="{78C97017-6FC3-485B-9764-EAC9E56C1D49}" type="datetimeFigureOut">
               <a:rPr lang="en-US" smtClean="0"/>
-              <a:t>4/16/2018</a:t>
+              <a:t>09-Apr-19</a:t>
             </a:fld>
             <a:endParaRPr lang="en-US"/>
           </a:p>
@@ -3071,7 +3067,7 @@
           <a:p>
             <a:fld id="{78C97017-6FC3-485B-9764-EAC9E56C1D49}" type="datetimeFigureOut">
               <a:rPr lang="en-US" smtClean="0"/>
-              <a:t>4/16/2018</a:t>
+              <a:t>09-Apr-19</a:t>
             </a:fld>
             <a:endParaRPr lang="en-US"/>
           </a:p>
@@ -3607,7 +3603,7 @@
           <a:p>
             <a:pPr algn="ctr"/>
             <a:r>
-              <a:rPr lang="en-US" sz="1050" b="1" dirty="0" err="1" smtClean="0">
+              <a:rPr lang="en-US" sz="1050" b="1" dirty="0" err="1">
                 <a:solidFill>
                   <a:srgbClr val="0070C0"/>
                 </a:solidFill>
@@ -3939,12 +3935,12 @@
           <a:p>
             <a:pPr algn="ctr"/>
             <a:r>
-              <a:rPr lang="en-US" sz="1050" dirty="0" err="1" smtClean="0">
+              <a:rPr lang="en-US" sz="1050" dirty="0" err="1">
                 <a:solidFill>
                   <a:schemeClr val="bg1"/>
                 </a:solidFill>
               </a:rPr>
-              <a:t>AddressBook</a:t>
+              <a:t>TaskBook</a:t>
             </a:r>
             <a:endParaRPr lang="en-US" sz="1050" dirty="0">
               <a:solidFill>
@@ -5815,7 +5811,7 @@
           <a:p>
             <a:pPr algn="ctr"/>
             <a:r>
-              <a:rPr lang="en-US" sz="1050" b="1" dirty="0" err="1" smtClean="0">
+              <a:rPr lang="en-US" sz="1050" b="1" dirty="0" err="1">
                 <a:solidFill>
                   <a:schemeClr val="bg1"/>
                 </a:solidFill>
@@ -6165,7 +6161,7 @@
           <a:p>
             <a:pPr algn="ctr"/>
             <a:r>
-              <a:rPr lang="en-US" sz="1050" dirty="0" err="1" smtClean="0">
+              <a:rPr lang="en-US" sz="1050" dirty="0" err="1">
                 <a:solidFill>
                   <a:schemeClr val="bg1"/>
                 </a:solidFill>
@@ -6173,7 +6169,7 @@
               <a:t>XYZCommand</a:t>
             </a:r>
             <a:r>
-              <a:rPr lang="en-US" sz="1050" dirty="0" smtClean="0">
+              <a:rPr lang="en-US" sz="1050" dirty="0">
                 <a:solidFill>
                   <a:schemeClr val="bg1"/>
                 </a:solidFill>
@@ -6181,7 +6177,7 @@
               <a:t> = </a:t>
             </a:r>
             <a:r>
-              <a:rPr lang="en-US" sz="1050" dirty="0" err="1" smtClean="0">
+              <a:rPr lang="en-US" sz="1050" dirty="0" err="1">
                 <a:solidFill>
                   <a:schemeClr val="bg1"/>
                 </a:solidFill>
@@ -6189,7 +6185,7 @@
               <a:t>AddCommand</a:t>
             </a:r>
             <a:r>
-              <a:rPr lang="en-US" sz="1050" dirty="0" smtClean="0">
+              <a:rPr lang="en-US" sz="1050" dirty="0">
                 <a:solidFill>
                   <a:schemeClr val="bg1"/>
                 </a:solidFill>
@@ -6197,7 +6193,7 @@
               <a:t>, </a:t>
             </a:r>
             <a:r>
-              <a:rPr lang="en-US" sz="1050" dirty="0" err="1" smtClean="0">
+              <a:rPr lang="en-US" sz="1050" dirty="0" err="1">
                 <a:solidFill>
                   <a:schemeClr val="bg1"/>
                 </a:solidFill>
@@ -6205,18 +6201,13 @@
               <a:t>FindCommand</a:t>
             </a:r>
             <a:r>
-              <a:rPr lang="en-US" sz="1050" dirty="0" smtClean="0">
+              <a:rPr lang="en-US" sz="1050" dirty="0">
                 <a:solidFill>
                   <a:schemeClr val="bg1"/>
                 </a:solidFill>
               </a:rPr>
               <a:t>, etc.</a:t>
             </a:r>
-            <a:endParaRPr lang="en-US" sz="1050" dirty="0">
-              <a:solidFill>
-                <a:schemeClr val="bg1"/>
-              </a:solidFill>
-            </a:endParaRPr>
           </a:p>
         </p:txBody>
       </p:sp>

</xml_diff>